<commit_message>
Se añaden más slides a las diapositivas
</commit_message>
<xml_diff>
--- a/Diapositivas.pptx
+++ b/Diapositivas.pptx
@@ -1,6 +1,6 @@
 
 <file path=ppt/presentation.xml><?xml version="1.0" encoding="utf-8"?>
-<p:presentation xmlns:a="http://schemas.openxmlformats.org/drawingml/2006/main" xmlns:r="http://schemas.openxmlformats.org/officeDocument/2006/relationships" xmlns:p="http://schemas.openxmlformats.org/presentationml/2006/main" autoCompressPictures="0">
+<p:presentation xmlns:a="http://schemas.openxmlformats.org/drawingml/2006/main" xmlns:r="http://schemas.openxmlformats.org/officeDocument/2006/relationships" xmlns:p="http://schemas.openxmlformats.org/presentationml/2006/main" saveSubsetFonts="1" autoCompressPictures="0">
   <p:sldMasterIdLst>
     <p:sldMasterId id="2147483648" r:id="rId1"/>
   </p:sldMasterIdLst>
@@ -18,8 +18,10 @@
     <p:sldId id="261" r:id="rId12"/>
     <p:sldId id="265" r:id="rId13"/>
     <p:sldId id="266" r:id="rId14"/>
-    <p:sldId id="270" r:id="rId15"/>
-    <p:sldId id="271" r:id="rId16"/>
+    <p:sldId id="272" r:id="rId15"/>
+    <p:sldId id="273" r:id="rId16"/>
+    <p:sldId id="270" r:id="rId17"/>
+    <p:sldId id="271" r:id="rId18"/>
   </p:sldIdLst>
   <p:sldSz cx="12192000" cy="6858000"/>
   <p:notesSz cx="6858000" cy="9144000"/>
@@ -462,7 +464,7 @@
             <a:fld id="{5923F103-BC34-4FE4-A40E-EDDEECFDA5D0}" type="datetimeFigureOut">
               <a:rPr lang="en-US" dirty="0"/>
               <a:pPr/>
-              <a:t>2/6/2018</a:t>
+              <a:t>2/6/18</a:t>
             </a:fld>
             <a:endParaRPr lang="en-US" dirty="0"/>
           </a:p>
@@ -565,7 +567,7 @@
             <a:fld id="{D57F1E4F-1CFF-5643-939E-217C01CDF565}" type="slidenum">
               <a:rPr lang="en-US" dirty="0"/>
               <a:pPr/>
-              <a:t>‹Nº›</a:t>
+              <a:t>‹Nr.›</a:t>
             </a:fld>
             <a:endParaRPr lang="en-US" dirty="0"/>
           </a:p>
@@ -1550,7 +1552,7 @@
           <a:p>
             <a:fld id="{923A1CC3-2375-41D4-9E03-427CAF2A4C1A}" type="datetimeFigureOut">
               <a:rPr lang="en-US" dirty="0"/>
-              <a:t>2/6/2018</a:t>
+              <a:t>2/6/18</a:t>
             </a:fld>
             <a:endParaRPr lang="en-US" dirty="0"/>
           </a:p>
@@ -1633,7 +1635,7 @@
             <a:fld id="{D57F1E4F-1CFF-5643-939E-217C01CDF565}" type="slidenum">
               <a:rPr lang="en-US" dirty="0"/>
               <a:pPr/>
-              <a:t>‹Nº›</a:t>
+              <a:t>‹Nr.›</a:t>
             </a:fld>
             <a:endParaRPr lang="en-US" dirty="0"/>
           </a:p>
@@ -2530,7 +2532,7 @@
           <a:p>
             <a:fld id="{AFF16868-8199-4C2C-A5B1-63AEE139F88E}" type="datetimeFigureOut">
               <a:rPr lang="en-US" dirty="0"/>
-              <a:t>2/6/2018</a:t>
+              <a:t>2/6/18</a:t>
             </a:fld>
             <a:endParaRPr lang="en-US" dirty="0"/>
           </a:p>
@@ -2613,7 +2615,7 @@
             <a:fld id="{D57F1E4F-1CFF-5643-939E-217C01CDF565}" type="slidenum">
               <a:rPr lang="en-US" dirty="0"/>
               <a:pPr/>
-              <a:t>‹Nº›</a:t>
+              <a:t>‹Nr.›</a:t>
             </a:fld>
             <a:endParaRPr lang="en-US" dirty="0"/>
           </a:p>
@@ -3664,7 +3666,7 @@
           <a:p>
             <a:fld id="{AAD9FF7F-6988-44CC-821B-644E70CD2F73}" type="datetimeFigureOut">
               <a:rPr lang="en-US" dirty="0"/>
-              <a:t>2/6/2018</a:t>
+              <a:t>2/6/18</a:t>
             </a:fld>
             <a:endParaRPr lang="en-US" dirty="0"/>
           </a:p>
@@ -3747,7 +3749,7 @@
             <a:fld id="{D57F1E4F-1CFF-5643-939E-217C01CDF565}" type="slidenum">
               <a:rPr lang="en-US" dirty="0"/>
               <a:pPr/>
-              <a:t>‹Nº›</a:t>
+              <a:t>‹Nr.›</a:t>
             </a:fld>
             <a:endParaRPr lang="en-US" dirty="0"/>
           </a:p>
@@ -4697,7 +4699,7 @@
           <a:p>
             <a:fld id="{5C12C299-16B2-4475-990D-751901EACC14}" type="datetimeFigureOut">
               <a:rPr lang="en-US" dirty="0"/>
-              <a:t>2/6/2018</a:t>
+              <a:t>2/6/18</a:t>
             </a:fld>
             <a:endParaRPr lang="en-US" dirty="0"/>
           </a:p>
@@ -4780,7 +4782,7 @@
             <a:fld id="{D57F1E4F-1CFF-5643-939E-217C01CDF565}" type="slidenum">
               <a:rPr lang="en-US" dirty="0"/>
               <a:pPr/>
-              <a:t>‹Nº›</a:t>
+              <a:t>‹Nr.›</a:t>
             </a:fld>
             <a:endParaRPr lang="en-US" dirty="0"/>
           </a:p>
@@ -5357,7 +5359,7 @@
           <a:p>
             <a:fld id="{9FE86839-B9D8-4651-8783-F325ECE74E65}" type="datetimeFigureOut">
               <a:rPr lang="en-US" dirty="0"/>
-              <a:t>2/6/2018</a:t>
+              <a:t>2/6/18</a:t>
             </a:fld>
             <a:endParaRPr lang="en-US" dirty="0"/>
           </a:p>
@@ -5404,7 +5406,7 @@
             <a:fld id="{D57F1E4F-1CFF-5643-939E-217C01CDF565}" type="slidenum">
               <a:rPr lang="en-US" dirty="0"/>
               <a:pPr/>
-              <a:t>‹Nº›</a:t>
+              <a:t>‹Nr.›</a:t>
             </a:fld>
             <a:endParaRPr lang="en-US" dirty="0"/>
           </a:p>
@@ -6218,7 +6220,7 @@
           <a:p>
             <a:fld id="{FD484F64-32F6-45C5-931F-ADC1662401D0}" type="datetimeFigureOut">
               <a:rPr lang="en-US" dirty="0"/>
-              <a:t>2/6/2018</a:t>
+              <a:t>2/6/18</a:t>
             </a:fld>
             <a:endParaRPr lang="en-US" dirty="0"/>
           </a:p>
@@ -6270,7 +6272,7 @@
             <a:fld id="{D57F1E4F-1CFF-5643-939E-217C01CDF565}" type="slidenum">
               <a:rPr lang="en-US" dirty="0"/>
               <a:pPr/>
-              <a:t>‹Nº›</a:t>
+              <a:t>‹Nr.›</a:t>
             </a:fld>
             <a:endParaRPr lang="en-US" dirty="0"/>
           </a:p>
@@ -6408,7 +6410,7 @@
           <a:p>
             <a:fld id="{53086D93-FCAC-47E0-A2EE-787E62CA814C}" type="datetimeFigureOut">
               <a:rPr lang="en-US" dirty="0"/>
-              <a:t>2/6/2018</a:t>
+              <a:t>2/6/18</a:t>
             </a:fld>
             <a:endParaRPr lang="en-US" dirty="0"/>
           </a:p>
@@ -6455,7 +6457,7 @@
             <a:fld id="{D57F1E4F-1CFF-5643-939E-217C01CDF565}" type="slidenum">
               <a:rPr lang="en-US" dirty="0"/>
               <a:pPr/>
-              <a:t>‹Nº›</a:t>
+              <a:t>‹Nr.›</a:t>
             </a:fld>
             <a:endParaRPr lang="en-US" dirty="0"/>
           </a:p>
@@ -7380,7 +7382,7 @@
           <a:p>
             <a:fld id="{CDA879A6-0FD0-4734-A311-86BFCA472E6E}" type="datetimeFigureOut">
               <a:rPr lang="en-US" dirty="0"/>
-              <a:t>2/6/2018</a:t>
+              <a:t>2/6/18</a:t>
             </a:fld>
             <a:endParaRPr lang="en-US" dirty="0"/>
           </a:p>
@@ -7463,7 +7465,7 @@
             <a:fld id="{D57F1E4F-1CFF-5643-939E-217C01CDF565}" type="slidenum">
               <a:rPr lang="en-US" dirty="0"/>
               <a:pPr/>
-              <a:t>‹Nº›</a:t>
+              <a:t>‹Nr.›</a:t>
             </a:fld>
             <a:endParaRPr lang="en-US" dirty="0"/>
           </a:p>
@@ -7591,7 +7593,7 @@
           <a:p>
             <a:fld id="{19C9CA7B-DFD4-44B5-8C60-D14B8CD1FB59}" type="datetimeFigureOut">
               <a:rPr lang="en-US" dirty="0"/>
-              <a:t>2/6/2018</a:t>
+              <a:t>2/6/18</a:t>
             </a:fld>
             <a:endParaRPr lang="en-US" dirty="0"/>
           </a:p>
@@ -7638,7 +7640,7 @@
             <a:fld id="{D57F1E4F-1CFF-5643-939E-217C01CDF565}" type="slidenum">
               <a:rPr lang="en-US" dirty="0"/>
               <a:pPr/>
-              <a:t>‹Nº›</a:t>
+              <a:t>‹Nr.›</a:t>
             </a:fld>
             <a:endParaRPr lang="en-US" dirty="0"/>
           </a:p>
@@ -8625,7 +8627,7 @@
           <a:p>
             <a:fld id="{F34E6425-0181-43F2-84FC-787E803FD2F8}" type="datetimeFigureOut">
               <a:rPr lang="en-US" dirty="0"/>
-              <a:t>2/6/2018</a:t>
+              <a:t>2/6/18</a:t>
             </a:fld>
             <a:endParaRPr lang="en-US" dirty="0"/>
           </a:p>
@@ -8708,7 +8710,7 @@
             <a:fld id="{D57F1E4F-1CFF-5643-939E-217C01CDF565}" type="slidenum">
               <a:rPr lang="en-US" dirty="0"/>
               <a:pPr/>
-              <a:t>‹Nº›</a:t>
+              <a:t>‹Nr.›</a:t>
             </a:fld>
             <a:endParaRPr lang="en-US" dirty="0"/>
           </a:p>
@@ -8897,7 +8899,7 @@
           <a:p>
             <a:fld id="{3BDB8791-F1B0-41E7-B7FD-A781E65C4266}" type="datetimeFigureOut">
               <a:rPr lang="en-US" dirty="0"/>
-              <a:t>2/6/2018</a:t>
+              <a:t>2/6/18</a:t>
             </a:fld>
             <a:endParaRPr lang="en-US" dirty="0"/>
           </a:p>
@@ -8944,7 +8946,7 @@
             <a:fld id="{D57F1E4F-1CFF-5643-939E-217C01CDF565}" type="slidenum">
               <a:rPr lang="en-US" dirty="0"/>
               <a:pPr/>
-              <a:t>‹Nº›</a:t>
+              <a:t>‹Nr.›</a:t>
             </a:fld>
             <a:endParaRPr lang="en-US" dirty="0"/>
           </a:p>
@@ -9307,7 +9309,7 @@
           <a:p>
             <a:fld id="{5FDD63B2-E120-4ED8-B27B-C685F510A5FE}" type="datetimeFigureOut">
               <a:rPr lang="en-US" dirty="0"/>
-              <a:t>2/6/2018</a:t>
+              <a:t>2/6/18</a:t>
             </a:fld>
             <a:endParaRPr lang="en-US" dirty="0"/>
           </a:p>
@@ -9354,7 +9356,7 @@
             <a:fld id="{D57F1E4F-1CFF-5643-939E-217C01CDF565}" type="slidenum">
               <a:rPr lang="en-US" dirty="0"/>
               <a:pPr/>
-              <a:t>‹Nº›</a:t>
+              <a:t>‹Nr.›</a:t>
             </a:fld>
             <a:endParaRPr lang="en-US" dirty="0"/>
           </a:p>
@@ -9434,7 +9436,7 @@
           <a:p>
             <a:fld id="{7AA18ACC-A947-437B-A130-35BD54FDF1E9}" type="datetimeFigureOut">
               <a:rPr lang="en-US" dirty="0"/>
-              <a:t>2/6/2018</a:t>
+              <a:t>2/6/18</a:t>
             </a:fld>
             <a:endParaRPr lang="en-US" dirty="0"/>
           </a:p>
@@ -9481,7 +9483,7 @@
             <a:fld id="{D57F1E4F-1CFF-5643-939E-217C01CDF565}" type="slidenum">
               <a:rPr lang="en-US" dirty="0"/>
               <a:pPr/>
-              <a:t>‹Nº›</a:t>
+              <a:t>‹Nr.›</a:t>
             </a:fld>
             <a:endParaRPr lang="en-US" dirty="0"/>
           </a:p>
@@ -9529,7 +9531,7 @@
           <a:p>
             <a:fld id="{7C8D7E02-BCB8-4D50-A234-369438C08659}" type="datetimeFigureOut">
               <a:rPr lang="en-US" dirty="0"/>
-              <a:t>2/6/2018</a:t>
+              <a:t>2/6/18</a:t>
             </a:fld>
             <a:endParaRPr lang="en-US" dirty="0"/>
           </a:p>
@@ -9612,7 +9614,7 @@
             <a:fld id="{D57F1E4F-1CFF-5643-939E-217C01CDF565}" type="slidenum">
               <a:rPr lang="en-US" dirty="0"/>
               <a:pPr/>
-              <a:t>‹Nº›</a:t>
+              <a:t>‹Nr.›</a:t>
             </a:fld>
             <a:endParaRPr lang="en-US" dirty="0"/>
           </a:p>
@@ -10610,7 +10612,7 @@
           <a:p>
             <a:fld id="{76E86A4C-8E40-4F87-A4F0-01A0687C5742}" type="datetimeFigureOut">
               <a:rPr lang="en-US" dirty="0"/>
-              <a:t>2/6/2018</a:t>
+              <a:t>2/6/18</a:t>
             </a:fld>
             <a:endParaRPr lang="en-US" dirty="0"/>
           </a:p>
@@ -10693,7 +10695,7 @@
             <a:fld id="{D57F1E4F-1CFF-5643-939E-217C01CDF565}" type="slidenum">
               <a:rPr lang="en-US" dirty="0"/>
               <a:pPr/>
-              <a:t>‹Nº›</a:t>
+              <a:t>‹Nr.›</a:t>
             </a:fld>
             <a:endParaRPr lang="en-US" dirty="0"/>
           </a:p>
@@ -11718,7 +11720,7 @@
           <a:p>
             <a:fld id="{35E72C73-2D91-4E12-BA25-F0AA0C03599B}" type="datetimeFigureOut">
               <a:rPr lang="en-US" dirty="0"/>
-              <a:t>2/6/2018</a:t>
+              <a:t>2/6/18</a:t>
             </a:fld>
             <a:endParaRPr lang="en-US" dirty="0"/>
           </a:p>
@@ -11801,7 +11803,7 @@
             <a:fld id="{D57F1E4F-1CFF-5643-939E-217C01CDF565}" type="slidenum">
               <a:rPr lang="en-US" dirty="0"/>
               <a:pPr/>
-              <a:t>‹Nº›</a:t>
+              <a:t>‹Nr.›</a:t>
             </a:fld>
             <a:endParaRPr lang="en-US" dirty="0"/>
           </a:p>
@@ -12715,7 +12717,7 @@
           <a:p>
             <a:fld id="{2BE451C3-0FF4-47C4-B829-773ADF60F88C}" type="datetimeFigureOut">
               <a:rPr lang="en-US" dirty="0"/>
-              <a:t>2/6/2018</a:t>
+              <a:t>2/6/18</a:t>
             </a:fld>
             <a:endParaRPr lang="en-US" dirty="0"/>
           </a:p>
@@ -12830,7 +12832,7 @@
             <a:fld id="{D57F1E4F-1CFF-5643-939E-217C01CDF565}" type="slidenum">
               <a:rPr lang="en-US" dirty="0"/>
               <a:pPr/>
-              <a:t>‹Nº›</a:t>
+              <a:t>‹Nr.›</a:t>
             </a:fld>
             <a:endParaRPr lang="en-US" dirty="0"/>
           </a:p>
@@ -13280,7 +13282,7 @@
           <p:cNvPr id="2" name="Título 1">
             <a:extLst>
               <a:ext uri="{FF2B5EF4-FFF2-40B4-BE49-F238E27FC236}">
-                <a16:creationId xmlns:a16="http://schemas.microsoft.com/office/drawing/2014/main" id="{7701F9BA-6C18-4FA1-8340-10CC544C5F3F}"/>
+                <a16:creationId xmlns:a16="http://schemas.microsoft.com/office/drawing/2014/main" xmlns="" id="{7701F9BA-6C18-4FA1-8340-10CC544C5F3F}"/>
               </a:ext>
             </a:extLst>
           </p:cNvPr>
@@ -13318,6 +13320,10 @@
             <a:br>
               <a:rPr lang="es-ES" sz="2000" dirty="0"/>
             </a:br>
+            <a:r>
+              <a:rPr lang="es-ES" sz="2000" dirty="0"/>
+              <a:t/>
+            </a:r>
             <a:br>
               <a:rPr lang="es-ES" sz="2000" dirty="0"/>
             </a:br>
@@ -13328,6 +13334,10 @@
             <a:br>
               <a:rPr lang="es-ES" sz="2000" dirty="0"/>
             </a:br>
+            <a:r>
+              <a:rPr lang="es-ES" sz="2000" dirty="0"/>
+              <a:t/>
+            </a:r>
             <a:br>
               <a:rPr lang="es-ES" sz="2000" dirty="0"/>
             </a:br>
@@ -13338,6 +13348,10 @@
             <a:br>
               <a:rPr lang="es-ES" sz="2000" dirty="0"/>
             </a:br>
+            <a:r>
+              <a:rPr lang="es-ES" sz="2000" dirty="0"/>
+              <a:t/>
+            </a:r>
             <a:br>
               <a:rPr lang="es-ES" sz="2000" dirty="0"/>
             </a:br>
@@ -13354,7 +13368,7 @@
           <p:cNvPr id="3" name="Subtítulo 2">
             <a:extLst>
               <a:ext uri="{FF2B5EF4-FFF2-40B4-BE49-F238E27FC236}">
-                <a16:creationId xmlns:a16="http://schemas.microsoft.com/office/drawing/2014/main" id="{F3C3D8CD-BCA9-4435-9734-F62B0618EDB0}"/>
+                <a16:creationId xmlns:a16="http://schemas.microsoft.com/office/drawing/2014/main" xmlns="" id="{F3C3D8CD-BCA9-4435-9734-F62B0618EDB0}"/>
               </a:ext>
             </a:extLst>
           </p:cNvPr>
@@ -13434,7 +13448,7 @@
           <p:cNvPr id="2" name="Título 1">
             <a:extLst>
               <a:ext uri="{FF2B5EF4-FFF2-40B4-BE49-F238E27FC236}">
-                <a16:creationId xmlns:a16="http://schemas.microsoft.com/office/drawing/2014/main" id="{62A2BB84-DA45-4E41-B8E5-E27FD6C0DE85}"/>
+                <a16:creationId xmlns:a16="http://schemas.microsoft.com/office/drawing/2014/main" xmlns="" id="{62A2BB84-DA45-4E41-B8E5-E27FD6C0DE85}"/>
               </a:ext>
             </a:extLst>
           </p:cNvPr>
@@ -13463,7 +13477,7 @@
           <p:cNvPr id="4" name="Marcador de contenido 3">
             <a:extLst>
               <a:ext uri="{FF2B5EF4-FFF2-40B4-BE49-F238E27FC236}">
-                <a16:creationId xmlns:a16="http://schemas.microsoft.com/office/drawing/2014/main" id="{43C77E4F-6F37-4E76-B4AE-9983F01ED698}"/>
+                <a16:creationId xmlns:a16="http://schemas.microsoft.com/office/drawing/2014/main" xmlns="" id="{43C77E4F-6F37-4E76-B4AE-9983F01ED698}"/>
               </a:ext>
             </a:extLst>
           </p:cNvPr>
@@ -13525,7 +13539,7 @@
           <p:cNvPr id="2" name="Título 1">
             <a:extLst>
               <a:ext uri="{FF2B5EF4-FFF2-40B4-BE49-F238E27FC236}">
-                <a16:creationId xmlns:a16="http://schemas.microsoft.com/office/drawing/2014/main" id="{C689DE6F-9A43-4223-8B04-A74F5623E790}"/>
+                <a16:creationId xmlns:a16="http://schemas.microsoft.com/office/drawing/2014/main" xmlns="" id="{C689DE6F-9A43-4223-8B04-A74F5623E790}"/>
               </a:ext>
             </a:extLst>
           </p:cNvPr>
@@ -13553,7 +13567,7 @@
           <p:cNvPr id="3" name="Marcador de contenido 2">
             <a:extLst>
               <a:ext uri="{FF2B5EF4-FFF2-40B4-BE49-F238E27FC236}">
-                <a16:creationId xmlns:a16="http://schemas.microsoft.com/office/drawing/2014/main" id="{43084E1D-9661-4205-98AA-3C540B8C729F}"/>
+                <a16:creationId xmlns:a16="http://schemas.microsoft.com/office/drawing/2014/main" xmlns="" id="{43084E1D-9661-4205-98AA-3C540B8C729F}"/>
               </a:ext>
             </a:extLst>
           </p:cNvPr>
@@ -13603,7 +13617,7 @@
           <p:cNvPr id="5" name="Imagen 4">
             <a:extLst>
               <a:ext uri="{FF2B5EF4-FFF2-40B4-BE49-F238E27FC236}">
-                <a16:creationId xmlns:a16="http://schemas.microsoft.com/office/drawing/2014/main" id="{38DA8563-77A7-4F1A-A2AB-67A995ECE779}"/>
+                <a16:creationId xmlns:a16="http://schemas.microsoft.com/office/drawing/2014/main" xmlns="" id="{38DA8563-77A7-4F1A-A2AB-67A995ECE779}"/>
               </a:ext>
             </a:extLst>
           </p:cNvPr>
@@ -13663,7 +13677,7 @@
           <p:cNvPr id="2" name="Título 1">
             <a:extLst>
               <a:ext uri="{FF2B5EF4-FFF2-40B4-BE49-F238E27FC236}">
-                <a16:creationId xmlns:a16="http://schemas.microsoft.com/office/drawing/2014/main" id="{A1E2E323-84A7-47F1-A8BD-94B0D24D9043}"/>
+                <a16:creationId xmlns:a16="http://schemas.microsoft.com/office/drawing/2014/main" xmlns="" id="{A1E2E323-84A7-47F1-A8BD-94B0D24D9043}"/>
               </a:ext>
             </a:extLst>
           </p:cNvPr>
@@ -13691,7 +13705,7 @@
           <p:cNvPr id="4" name="Marcador de contenido 3">
             <a:extLst>
               <a:ext uri="{FF2B5EF4-FFF2-40B4-BE49-F238E27FC236}">
-                <a16:creationId xmlns:a16="http://schemas.microsoft.com/office/drawing/2014/main" id="{10A6A846-35BF-4B25-A8C9-A2E8B03064DB}"/>
+                <a16:creationId xmlns:a16="http://schemas.microsoft.com/office/drawing/2014/main" xmlns="" id="{10A6A846-35BF-4B25-A8C9-A2E8B03064DB}"/>
               </a:ext>
             </a:extLst>
           </p:cNvPr>
@@ -13723,7 +13737,7 @@
           <p:cNvPr id="5" name="Imagen 4">
             <a:extLst>
               <a:ext uri="{FF2B5EF4-FFF2-40B4-BE49-F238E27FC236}">
-                <a16:creationId xmlns:a16="http://schemas.microsoft.com/office/drawing/2014/main" id="{005FF0DF-6F0C-451A-95FD-25AA21F22F9E}"/>
+                <a16:creationId xmlns:a16="http://schemas.microsoft.com/office/drawing/2014/main" xmlns="" id="{005FF0DF-6F0C-451A-95FD-25AA21F22F9E}"/>
               </a:ext>
             </a:extLst>
           </p:cNvPr>
@@ -13753,7 +13767,7 @@
           <p:cNvPr id="7" name="Conector recto de flecha 6">
             <a:extLst>
               <a:ext uri="{FF2B5EF4-FFF2-40B4-BE49-F238E27FC236}">
-                <a16:creationId xmlns:a16="http://schemas.microsoft.com/office/drawing/2014/main" id="{7F017B8C-6C26-468E-9278-FFE362E19BBD}"/>
+                <a16:creationId xmlns:a16="http://schemas.microsoft.com/office/drawing/2014/main" xmlns="" id="{7F017B8C-6C26-468E-9278-FFE362E19BBD}"/>
               </a:ext>
             </a:extLst>
           </p:cNvPr>
@@ -13794,7 +13808,7 @@
           <p:cNvPr id="9" name="CuadroTexto 8">
             <a:extLst>
               <a:ext uri="{FF2B5EF4-FFF2-40B4-BE49-F238E27FC236}">
-                <a16:creationId xmlns:a16="http://schemas.microsoft.com/office/drawing/2014/main" id="{FBA7DE96-9D69-4D04-894E-354D7C9EFA84}"/>
+                <a16:creationId xmlns:a16="http://schemas.microsoft.com/office/drawing/2014/main" xmlns="" id="{FBA7DE96-9D69-4D04-894E-354D7C9EFA84}"/>
               </a:ext>
             </a:extLst>
           </p:cNvPr>
@@ -13859,7 +13873,7 @@
           <p:cNvPr id="2" name="Título 1">
             <a:extLst>
               <a:ext uri="{FF2B5EF4-FFF2-40B4-BE49-F238E27FC236}">
-                <a16:creationId xmlns:a16="http://schemas.microsoft.com/office/drawing/2014/main" id="{7E794387-9356-4CBE-987D-81398866A0F5}"/>
+                <a16:creationId xmlns:a16="http://schemas.microsoft.com/office/drawing/2014/main" xmlns="" id="{7E794387-9356-4CBE-987D-81398866A0F5}"/>
               </a:ext>
             </a:extLst>
           </p:cNvPr>
@@ -13887,7 +13901,7 @@
           <p:cNvPr id="4" name="Marcador de contenido 3">
             <a:extLst>
               <a:ext uri="{FF2B5EF4-FFF2-40B4-BE49-F238E27FC236}">
-                <a16:creationId xmlns:a16="http://schemas.microsoft.com/office/drawing/2014/main" id="{44C50B73-31EE-42B6-852C-AC7C5B405A95}"/>
+                <a16:creationId xmlns:a16="http://schemas.microsoft.com/office/drawing/2014/main" xmlns="" id="{44C50B73-31EE-42B6-852C-AC7C5B405A95}"/>
               </a:ext>
             </a:extLst>
           </p:cNvPr>
@@ -13919,7 +13933,7 @@
           <p:cNvPr id="5" name="Imagen 4">
             <a:extLst>
               <a:ext uri="{FF2B5EF4-FFF2-40B4-BE49-F238E27FC236}">
-                <a16:creationId xmlns:a16="http://schemas.microsoft.com/office/drawing/2014/main" id="{19DF8AC8-3518-4649-91FC-B3C777BD958F}"/>
+                <a16:creationId xmlns:a16="http://schemas.microsoft.com/office/drawing/2014/main" xmlns="" id="{19DF8AC8-3518-4649-91FC-B3C777BD958F}"/>
               </a:ext>
             </a:extLst>
           </p:cNvPr>
@@ -13949,7 +13963,7 @@
           <p:cNvPr id="6" name="Rectángulo 5">
             <a:extLst>
               <a:ext uri="{FF2B5EF4-FFF2-40B4-BE49-F238E27FC236}">
-                <a16:creationId xmlns:a16="http://schemas.microsoft.com/office/drawing/2014/main" id="{C5A9CB40-2B12-475E-B02C-0FE03DECAE12}"/>
+                <a16:creationId xmlns:a16="http://schemas.microsoft.com/office/drawing/2014/main" xmlns="" id="{C5A9CB40-2B12-475E-B02C-0FE03DECAE12}"/>
               </a:ext>
             </a:extLst>
           </p:cNvPr>
@@ -13994,7 +14008,7 @@
           <p:cNvPr id="7" name="CuadroTexto 6">
             <a:extLst>
               <a:ext uri="{FF2B5EF4-FFF2-40B4-BE49-F238E27FC236}">
-                <a16:creationId xmlns:a16="http://schemas.microsoft.com/office/drawing/2014/main" id="{B9E0DCBA-D6F3-44C6-B365-0412E00DFEC2}"/>
+                <a16:creationId xmlns:a16="http://schemas.microsoft.com/office/drawing/2014/main" xmlns="" id="{B9E0DCBA-D6F3-44C6-B365-0412E00DFEC2}"/>
               </a:ext>
             </a:extLst>
           </p:cNvPr>
@@ -14056,10 +14070,298 @@
       </p:grpSpPr>
       <p:sp>
         <p:nvSpPr>
+          <p:cNvPr id="2" name="Título 1"/>
+          <p:cNvSpPr>
+            <a:spLocks noGrp="1"/>
+          </p:cNvSpPr>
+          <p:nvPr>
+            <p:ph type="title"/>
+          </p:nvPr>
+        </p:nvSpPr>
+        <p:spPr/>
+        <p:txBody>
+          <a:bodyPr/>
+          <a:lstStyle/>
+          <a:p>
+            <a:r>
+              <a:rPr lang="es-ES_tradnl" dirty="0" smtClean="0"/>
+              <a:t>Carrito de compras</a:t>
+            </a:r>
+            <a:endParaRPr lang="es-ES_tradnl" dirty="0"/>
+          </a:p>
+        </p:txBody>
+      </p:sp>
+      <p:pic>
+        <p:nvPicPr>
+          <p:cNvPr id="4" name="Imagen 3"/>
+          <p:cNvPicPr>
+            <a:picLocks noChangeAspect="1"/>
+          </p:cNvPicPr>
+          <p:nvPr/>
+        </p:nvPicPr>
+        <p:blipFill>
+          <a:blip r:embed="rId2"/>
+          <a:stretch>
+            <a:fillRect/>
+          </a:stretch>
+        </p:blipFill>
+        <p:spPr>
+          <a:xfrm>
+            <a:off x="665921" y="1928985"/>
+            <a:ext cx="5717187" cy="2951129"/>
+          </a:xfrm>
+          <a:prstGeom prst="rect">
+            <a:avLst/>
+          </a:prstGeom>
+        </p:spPr>
+      </p:pic>
+      <p:pic>
+        <p:nvPicPr>
+          <p:cNvPr id="5" name="Imagen 4"/>
+          <p:cNvPicPr>
+            <a:picLocks noChangeAspect="1"/>
+          </p:cNvPicPr>
+          <p:nvPr/>
+        </p:nvPicPr>
+        <p:blipFill>
+          <a:blip r:embed="rId3"/>
+          <a:stretch>
+            <a:fillRect/>
+          </a:stretch>
+        </p:blipFill>
+        <p:spPr>
+          <a:xfrm>
+            <a:off x="6479485" y="4880114"/>
+            <a:ext cx="5295900" cy="1346200"/>
+          </a:xfrm>
+          <a:prstGeom prst="rect">
+            <a:avLst/>
+          </a:prstGeom>
+        </p:spPr>
+      </p:pic>
+      <p:sp>
+        <p:nvSpPr>
+          <p:cNvPr id="6" name="CuadroTexto 5">
+            <a:extLst>
+              <a:ext uri="{FF2B5EF4-FFF2-40B4-BE49-F238E27FC236}">
+                <a16:creationId xmlns:a16="http://schemas.microsoft.com/office/drawing/2014/main" xmlns="" id="{B9E0DCBA-D6F3-44C6-B365-0412E00DFEC2}"/>
+              </a:ext>
+            </a:extLst>
+          </p:cNvPr>
+          <p:cNvSpPr txBox="1"/>
+          <p:nvPr/>
+        </p:nvSpPr>
+        <p:spPr>
+          <a:xfrm>
+            <a:off x="6605124" y="3187809"/>
+            <a:ext cx="5170261" cy="369332"/>
+          </a:xfrm>
+          <a:prstGeom prst="rect">
+            <a:avLst/>
+          </a:prstGeom>
+          <a:noFill/>
+        </p:spPr>
+        <p:txBody>
+          <a:bodyPr wrap="square" rtlCol="0">
+            <a:spAutoFit/>
+          </a:bodyPr>
+          <a:lstStyle/>
+          <a:p>
+            <a:r>
+              <a:rPr lang="es-ES" dirty="0" smtClean="0"/>
+              <a:t>Se añaden productos al carrito</a:t>
+            </a:r>
+            <a:endParaRPr lang="es-ES" dirty="0"/>
+          </a:p>
+        </p:txBody>
+      </p:sp>
+      <p:sp>
+        <p:nvSpPr>
+          <p:cNvPr id="7" name="CuadroTexto 6">
+            <a:extLst>
+              <a:ext uri="{FF2B5EF4-FFF2-40B4-BE49-F238E27FC236}">
+                <a16:creationId xmlns:a16="http://schemas.microsoft.com/office/drawing/2014/main" xmlns="" id="{B9E0DCBA-D6F3-44C6-B365-0412E00DFEC2}"/>
+              </a:ext>
+            </a:extLst>
+          </p:cNvPr>
+          <p:cNvSpPr txBox="1"/>
+          <p:nvPr/>
+        </p:nvSpPr>
+        <p:spPr>
+          <a:xfrm>
+            <a:off x="1154954" y="5368548"/>
+            <a:ext cx="5170261" cy="646331"/>
+          </a:xfrm>
+          <a:prstGeom prst="rect">
+            <a:avLst/>
+          </a:prstGeom>
+          <a:noFill/>
+        </p:spPr>
+        <p:txBody>
+          <a:bodyPr wrap="square" rtlCol="0">
+            <a:spAutoFit/>
+          </a:bodyPr>
+          <a:lstStyle/>
+          <a:p>
+            <a:r>
+              <a:rPr lang="es-ES" dirty="0" smtClean="0"/>
+              <a:t>Se finaliza la compra y se muestra el listado de todas las preguntas</a:t>
+            </a:r>
+            <a:endParaRPr lang="es-ES" dirty="0"/>
+          </a:p>
+        </p:txBody>
+      </p:sp>
+    </p:spTree>
+    <p:extLst>
+      <p:ext uri="{BB962C8B-B14F-4D97-AF65-F5344CB8AC3E}">
+        <p14:creationId xmlns:p14="http://schemas.microsoft.com/office/powerpoint/2010/main" val="1384948051"/>
+      </p:ext>
+    </p:extLst>
+  </p:cSld>
+  <p:clrMapOvr>
+    <a:masterClrMapping/>
+  </p:clrMapOvr>
+</p:sld>
+</file>
+
+<file path=ppt/slides/slide15.xml><?xml version="1.0" encoding="utf-8"?>
+<p:sld xmlns:a="http://schemas.openxmlformats.org/drawingml/2006/main" xmlns:r="http://schemas.openxmlformats.org/officeDocument/2006/relationships" xmlns:p="http://schemas.openxmlformats.org/presentationml/2006/main">
+  <p:cSld>
+    <p:spTree>
+      <p:nvGrpSpPr>
+        <p:cNvPr id="1" name=""/>
+        <p:cNvGrpSpPr/>
+        <p:nvPr/>
+      </p:nvGrpSpPr>
+      <p:grpSpPr>
+        <a:xfrm>
+          <a:off x="0" y="0"/>
+          <a:ext cx="0" cy="0"/>
+          <a:chOff x="0" y="0"/>
+          <a:chExt cx="0" cy="0"/>
+        </a:xfrm>
+      </p:grpSpPr>
+      <p:sp>
+        <p:nvSpPr>
+          <p:cNvPr id="2" name="Título 1"/>
+          <p:cNvSpPr>
+            <a:spLocks noGrp="1"/>
+          </p:cNvSpPr>
+          <p:nvPr>
+            <p:ph type="title"/>
+          </p:nvPr>
+        </p:nvSpPr>
+        <p:spPr/>
+        <p:txBody>
+          <a:bodyPr/>
+          <a:lstStyle/>
+          <a:p>
+            <a:r>
+              <a:rPr lang="es-ES_tradnl" dirty="0" smtClean="0"/>
+              <a:t>Carrito de compras</a:t>
+            </a:r>
+            <a:endParaRPr lang="es-ES_tradnl" dirty="0"/>
+          </a:p>
+        </p:txBody>
+      </p:sp>
+      <p:pic>
+        <p:nvPicPr>
+          <p:cNvPr id="4" name="Marcador de contenido 3"/>
+          <p:cNvPicPr>
+            <a:picLocks noGrp="1" noChangeAspect="1"/>
+          </p:cNvPicPr>
+          <p:nvPr>
+            <p:ph idx="1"/>
+          </p:nvPr>
+        </p:nvPicPr>
+        <p:blipFill>
+          <a:blip r:embed="rId2"/>
+          <a:stretch>
+            <a:fillRect/>
+          </a:stretch>
+        </p:blipFill>
+        <p:spPr>
+          <a:xfrm>
+            <a:off x="7007087" y="632289"/>
+            <a:ext cx="3955774" cy="5991013"/>
+          </a:xfrm>
+          <a:prstGeom prst="rect">
+            <a:avLst/>
+          </a:prstGeom>
+        </p:spPr>
+      </p:pic>
+      <p:sp>
+        <p:nvSpPr>
+          <p:cNvPr id="5" name="CuadroTexto 4">
+            <a:extLst>
+              <a:ext uri="{FF2B5EF4-FFF2-40B4-BE49-F238E27FC236}">
+                <a16:creationId xmlns:a16="http://schemas.microsoft.com/office/drawing/2014/main" xmlns="" id="{B9E0DCBA-D6F3-44C6-B365-0412E00DFEC2}"/>
+              </a:ext>
+            </a:extLst>
+          </p:cNvPr>
+          <p:cNvSpPr txBox="1"/>
+          <p:nvPr/>
+        </p:nvSpPr>
+        <p:spPr>
+          <a:xfrm>
+            <a:off x="1313981" y="3505635"/>
+            <a:ext cx="5170261" cy="369332"/>
+          </a:xfrm>
+          <a:prstGeom prst="rect">
+            <a:avLst/>
+          </a:prstGeom>
+          <a:noFill/>
+        </p:spPr>
+        <p:txBody>
+          <a:bodyPr wrap="square" rtlCol="0">
+            <a:spAutoFit/>
+          </a:bodyPr>
+          <a:lstStyle/>
+          <a:p>
+            <a:r>
+              <a:rPr lang="es-ES" dirty="0" smtClean="0"/>
+              <a:t>Listado de compras y el valor total a pagar</a:t>
+            </a:r>
+            <a:endParaRPr lang="es-ES" dirty="0"/>
+          </a:p>
+        </p:txBody>
+      </p:sp>
+    </p:spTree>
+    <p:extLst>
+      <p:ext uri="{BB962C8B-B14F-4D97-AF65-F5344CB8AC3E}">
+        <p14:creationId xmlns:p14="http://schemas.microsoft.com/office/powerpoint/2010/main" val="506566414"/>
+      </p:ext>
+    </p:extLst>
+  </p:cSld>
+  <p:clrMapOvr>
+    <a:masterClrMapping/>
+  </p:clrMapOvr>
+</p:sld>
+</file>
+
+<file path=ppt/slides/slide16.xml><?xml version="1.0" encoding="utf-8"?>
+<p:sld xmlns:a="http://schemas.openxmlformats.org/drawingml/2006/main" xmlns:r="http://schemas.openxmlformats.org/officeDocument/2006/relationships" xmlns:p="http://schemas.openxmlformats.org/presentationml/2006/main">
+  <p:cSld>
+    <p:spTree>
+      <p:nvGrpSpPr>
+        <p:cNvPr id="1" name=""/>
+        <p:cNvGrpSpPr/>
+        <p:nvPr/>
+      </p:nvGrpSpPr>
+      <p:grpSpPr>
+        <a:xfrm>
+          <a:off x="0" y="0"/>
+          <a:ext cx="0" cy="0"/>
+          <a:chOff x="0" y="0"/>
+          <a:chExt cx="0" cy="0"/>
+        </a:xfrm>
+      </p:grpSpPr>
+      <p:sp>
+        <p:nvSpPr>
           <p:cNvPr id="2" name="Título 1">
             <a:extLst>
               <a:ext uri="{FF2B5EF4-FFF2-40B4-BE49-F238E27FC236}">
-                <a16:creationId xmlns:a16="http://schemas.microsoft.com/office/drawing/2014/main" id="{91B258BE-1051-4A0D-B3E9-090DB3BB8A20}"/>
+                <a16:creationId xmlns:a16="http://schemas.microsoft.com/office/drawing/2014/main" xmlns="" id="{91B258BE-1051-4A0D-B3E9-090DB3BB8A20}"/>
               </a:ext>
             </a:extLst>
           </p:cNvPr>
@@ -14087,7 +14389,7 @@
           <p:cNvPr id="4" name="Marcador de contenido 3">
             <a:extLst>
               <a:ext uri="{FF2B5EF4-FFF2-40B4-BE49-F238E27FC236}">
-                <a16:creationId xmlns:a16="http://schemas.microsoft.com/office/drawing/2014/main" id="{C5E88AEF-27DC-47D7-841D-9267D0828863}"/>
+                <a16:creationId xmlns:a16="http://schemas.microsoft.com/office/drawing/2014/main" xmlns="" id="{C5E88AEF-27DC-47D7-841D-9267D0828863}"/>
               </a:ext>
             </a:extLst>
           </p:cNvPr>
@@ -14119,7 +14421,7 @@
           <p:cNvPr id="5" name="Imagen 4">
             <a:extLst>
               <a:ext uri="{FF2B5EF4-FFF2-40B4-BE49-F238E27FC236}">
-                <a16:creationId xmlns:a16="http://schemas.microsoft.com/office/drawing/2014/main" id="{9BDA0516-1CB2-4559-A341-302EEA912986}"/>
+                <a16:creationId xmlns:a16="http://schemas.microsoft.com/office/drawing/2014/main" xmlns="" id="{9BDA0516-1CB2-4559-A341-302EEA912986}"/>
               </a:ext>
             </a:extLst>
           </p:cNvPr>
@@ -14157,7 +14459,7 @@
 </p:sld>
 </file>
 
-<file path=ppt/slides/slide15.xml><?xml version="1.0" encoding="utf-8"?>
+<file path=ppt/slides/slide17.xml><?xml version="1.0" encoding="utf-8"?>
 <p:sld xmlns:a="http://schemas.openxmlformats.org/drawingml/2006/main" xmlns:r="http://schemas.openxmlformats.org/officeDocument/2006/relationships" xmlns:p="http://schemas.openxmlformats.org/presentationml/2006/main">
   <p:cSld>
     <p:spTree>
@@ -14179,7 +14481,7 @@
           <p:cNvPr id="2" name="Título 1">
             <a:extLst>
               <a:ext uri="{FF2B5EF4-FFF2-40B4-BE49-F238E27FC236}">
-                <a16:creationId xmlns:a16="http://schemas.microsoft.com/office/drawing/2014/main" id="{39A17D81-86A8-4EC8-9733-D5D052E1E58A}"/>
+                <a16:creationId xmlns:a16="http://schemas.microsoft.com/office/drawing/2014/main" xmlns="" id="{39A17D81-86A8-4EC8-9733-D5D052E1E58A}"/>
               </a:ext>
             </a:extLst>
           </p:cNvPr>
@@ -14208,7 +14510,7 @@
           <p:cNvPr id="3" name="Marcador de texto 2">
             <a:extLst>
               <a:ext uri="{FF2B5EF4-FFF2-40B4-BE49-F238E27FC236}">
-                <a16:creationId xmlns:a16="http://schemas.microsoft.com/office/drawing/2014/main" id="{55B805FA-6AAC-4D55-947B-F655CE0A6222}"/>
+                <a16:creationId xmlns:a16="http://schemas.microsoft.com/office/drawing/2014/main" xmlns="" id="{55B805FA-6AAC-4D55-947B-F655CE0A6222}"/>
               </a:ext>
             </a:extLst>
           </p:cNvPr>
@@ -14263,7 +14565,7 @@
           <p:cNvPr id="2" name="Título 1">
             <a:extLst>
               <a:ext uri="{FF2B5EF4-FFF2-40B4-BE49-F238E27FC236}">
-                <a16:creationId xmlns:a16="http://schemas.microsoft.com/office/drawing/2014/main" id="{363F2FB1-879E-48BC-89E0-33880BB37E3B}"/>
+                <a16:creationId xmlns:a16="http://schemas.microsoft.com/office/drawing/2014/main" xmlns="" id="{363F2FB1-879E-48BC-89E0-33880BB37E3B}"/>
               </a:ext>
             </a:extLst>
           </p:cNvPr>
@@ -14296,7 +14598,7 @@
           <p:cNvPr id="4" name="Imagen 3">
             <a:extLst>
               <a:ext uri="{FF2B5EF4-FFF2-40B4-BE49-F238E27FC236}">
-                <a16:creationId xmlns:a16="http://schemas.microsoft.com/office/drawing/2014/main" id="{D2F796F2-7333-4D4D-AD31-077C66951844}"/>
+                <a16:creationId xmlns:a16="http://schemas.microsoft.com/office/drawing/2014/main" xmlns="" id="{D2F796F2-7333-4D4D-AD31-077C66951844}"/>
               </a:ext>
             </a:extLst>
           </p:cNvPr>
@@ -14355,7 +14657,7 @@
           <p:cNvPr id="2" name="Título 1">
             <a:extLst>
               <a:ext uri="{FF2B5EF4-FFF2-40B4-BE49-F238E27FC236}">
-                <a16:creationId xmlns:a16="http://schemas.microsoft.com/office/drawing/2014/main" id="{F63B5A07-9EAB-48D9-B45E-DF443769F44D}"/>
+                <a16:creationId xmlns:a16="http://schemas.microsoft.com/office/drawing/2014/main" xmlns="" id="{F63B5A07-9EAB-48D9-B45E-DF443769F44D}"/>
               </a:ext>
             </a:extLst>
           </p:cNvPr>
@@ -14383,7 +14685,7 @@
           <p:cNvPr id="4" name="Rectángulo 3">
             <a:extLst>
               <a:ext uri="{FF2B5EF4-FFF2-40B4-BE49-F238E27FC236}">
-                <a16:creationId xmlns:a16="http://schemas.microsoft.com/office/drawing/2014/main" id="{8A6CF90D-681E-4907-B186-3FB2785C3B59}"/>
+                <a16:creationId xmlns:a16="http://schemas.microsoft.com/office/drawing/2014/main" xmlns="" id="{8A6CF90D-681E-4907-B186-3FB2785C3B59}"/>
               </a:ext>
             </a:extLst>
           </p:cNvPr>
@@ -14427,7 +14729,7 @@
           <p:cNvPr id="5" name="Rectángulo 4">
             <a:extLst>
               <a:ext uri="{FF2B5EF4-FFF2-40B4-BE49-F238E27FC236}">
-                <a16:creationId xmlns:a16="http://schemas.microsoft.com/office/drawing/2014/main" id="{D6C9693E-6185-4F94-A99F-672DD3416C56}"/>
+                <a16:creationId xmlns:a16="http://schemas.microsoft.com/office/drawing/2014/main" xmlns="" id="{D6C9693E-6185-4F94-A99F-672DD3416C56}"/>
               </a:ext>
             </a:extLst>
           </p:cNvPr>
@@ -14475,7 +14777,7 @@
           <p:cNvPr id="6" name="Rectángulo 5">
             <a:extLst>
               <a:ext uri="{FF2B5EF4-FFF2-40B4-BE49-F238E27FC236}">
-                <a16:creationId xmlns:a16="http://schemas.microsoft.com/office/drawing/2014/main" id="{C0F0766D-1AD0-4ABB-9A3D-09B72DD59AEF}"/>
+                <a16:creationId xmlns:a16="http://schemas.microsoft.com/office/drawing/2014/main" xmlns="" id="{C0F0766D-1AD0-4ABB-9A3D-09B72DD59AEF}"/>
               </a:ext>
             </a:extLst>
           </p:cNvPr>
@@ -14522,7 +14824,7 @@
           <p:cNvPr id="7" name="Rectángulo 6">
             <a:extLst>
               <a:ext uri="{FF2B5EF4-FFF2-40B4-BE49-F238E27FC236}">
-                <a16:creationId xmlns:a16="http://schemas.microsoft.com/office/drawing/2014/main" id="{0C120EC9-B04A-4580-8AB0-D030F982FB1C}"/>
+                <a16:creationId xmlns:a16="http://schemas.microsoft.com/office/drawing/2014/main" xmlns="" id="{0C120EC9-B04A-4580-8AB0-D030F982FB1C}"/>
               </a:ext>
             </a:extLst>
           </p:cNvPr>
@@ -14570,7 +14872,7 @@
           <p:cNvPr id="8" name="Rectángulo 7">
             <a:extLst>
               <a:ext uri="{FF2B5EF4-FFF2-40B4-BE49-F238E27FC236}">
-                <a16:creationId xmlns:a16="http://schemas.microsoft.com/office/drawing/2014/main" id="{E98B2906-129A-454F-B6A6-37736E2BF54A}"/>
+                <a16:creationId xmlns:a16="http://schemas.microsoft.com/office/drawing/2014/main" xmlns="" id="{E98B2906-129A-454F-B6A6-37736E2BF54A}"/>
               </a:ext>
             </a:extLst>
           </p:cNvPr>
@@ -14618,7 +14920,7 @@
           <p:cNvPr id="10" name="Rectángulo 9">
             <a:extLst>
               <a:ext uri="{FF2B5EF4-FFF2-40B4-BE49-F238E27FC236}">
-                <a16:creationId xmlns:a16="http://schemas.microsoft.com/office/drawing/2014/main" id="{E6AE2BA1-C00B-4956-B764-5805CA971C1D}"/>
+                <a16:creationId xmlns:a16="http://schemas.microsoft.com/office/drawing/2014/main" xmlns="" id="{E6AE2BA1-C00B-4956-B764-5805CA971C1D}"/>
               </a:ext>
             </a:extLst>
           </p:cNvPr>
@@ -14665,7 +14967,7 @@
           <p:cNvPr id="11" name="CuadroTexto 10">
             <a:extLst>
               <a:ext uri="{FF2B5EF4-FFF2-40B4-BE49-F238E27FC236}">
-                <a16:creationId xmlns:a16="http://schemas.microsoft.com/office/drawing/2014/main" id="{CC644679-1828-418A-8BF6-A8DE3B227D75}"/>
+                <a16:creationId xmlns:a16="http://schemas.microsoft.com/office/drawing/2014/main" xmlns="" id="{CC644679-1828-418A-8BF6-A8DE3B227D75}"/>
               </a:ext>
             </a:extLst>
           </p:cNvPr>
@@ -14939,7 +15241,7 @@
           <p:cNvPr id="2" name="Título 1">
             <a:extLst>
               <a:ext uri="{FF2B5EF4-FFF2-40B4-BE49-F238E27FC236}">
-                <a16:creationId xmlns:a16="http://schemas.microsoft.com/office/drawing/2014/main" id="{AFFAECB4-81E8-491F-A2AC-2BC8EAE6C564}"/>
+                <a16:creationId xmlns:a16="http://schemas.microsoft.com/office/drawing/2014/main" xmlns="" id="{AFFAECB4-81E8-491F-A2AC-2BC8EAE6C564}"/>
               </a:ext>
             </a:extLst>
           </p:cNvPr>
@@ -14967,7 +15269,7 @@
           <p:cNvPr id="3" name="Marcador de contenido 2">
             <a:extLst>
               <a:ext uri="{FF2B5EF4-FFF2-40B4-BE49-F238E27FC236}">
-                <a16:creationId xmlns:a16="http://schemas.microsoft.com/office/drawing/2014/main" id="{12BF00F9-FF8E-4966-A3B9-985D2127F143}"/>
+                <a16:creationId xmlns:a16="http://schemas.microsoft.com/office/drawing/2014/main" xmlns="" id="{12BF00F9-FF8E-4966-A3B9-985D2127F143}"/>
               </a:ext>
             </a:extLst>
           </p:cNvPr>
@@ -15079,7 +15381,7 @@
           <p:cNvPr id="2" name="Título 1">
             <a:extLst>
               <a:ext uri="{FF2B5EF4-FFF2-40B4-BE49-F238E27FC236}">
-                <a16:creationId xmlns:a16="http://schemas.microsoft.com/office/drawing/2014/main" id="{3ED622B5-1530-4182-9E70-83D43C1123D6}"/>
+                <a16:creationId xmlns:a16="http://schemas.microsoft.com/office/drawing/2014/main" xmlns="" id="{3ED622B5-1530-4182-9E70-83D43C1123D6}"/>
               </a:ext>
             </a:extLst>
           </p:cNvPr>
@@ -15107,7 +15409,7 @@
           <p:cNvPr id="3" name="Marcador de contenido 2">
             <a:extLst>
               <a:ext uri="{FF2B5EF4-FFF2-40B4-BE49-F238E27FC236}">
-                <a16:creationId xmlns:a16="http://schemas.microsoft.com/office/drawing/2014/main" id="{9E72D5CD-F16F-4A2D-A538-1AA9D841F34D}"/>
+                <a16:creationId xmlns:a16="http://schemas.microsoft.com/office/drawing/2014/main" xmlns="" id="{9E72D5CD-F16F-4A2D-A538-1AA9D841F34D}"/>
               </a:ext>
             </a:extLst>
           </p:cNvPr>
@@ -15225,7 +15527,7 @@
           <p:cNvPr id="2" name="Título 1">
             <a:extLst>
               <a:ext uri="{FF2B5EF4-FFF2-40B4-BE49-F238E27FC236}">
-                <a16:creationId xmlns:a16="http://schemas.microsoft.com/office/drawing/2014/main" id="{954B69A6-73BE-4E0A-9CBB-0FA01C07BB9F}"/>
+                <a16:creationId xmlns:a16="http://schemas.microsoft.com/office/drawing/2014/main" xmlns="" id="{954B69A6-73BE-4E0A-9CBB-0FA01C07BB9F}"/>
               </a:ext>
             </a:extLst>
           </p:cNvPr>
@@ -15440,7 +15742,7 @@
           <p:cNvPr id="2" name="Título 1">
             <a:extLst>
               <a:ext uri="{FF2B5EF4-FFF2-40B4-BE49-F238E27FC236}">
-                <a16:creationId xmlns:a16="http://schemas.microsoft.com/office/drawing/2014/main" id="{E358CFCB-6290-4C44-8CA0-F1F32E28B087}"/>
+                <a16:creationId xmlns:a16="http://schemas.microsoft.com/office/drawing/2014/main" xmlns="" id="{E358CFCB-6290-4C44-8CA0-F1F32E28B087}"/>
               </a:ext>
             </a:extLst>
           </p:cNvPr>
@@ -15468,7 +15770,7 @@
           <p:cNvPr id="6" name="Marcador de contenido 5">
             <a:extLst>
               <a:ext uri="{FF2B5EF4-FFF2-40B4-BE49-F238E27FC236}">
-                <a16:creationId xmlns:a16="http://schemas.microsoft.com/office/drawing/2014/main" id="{643BFCF4-45B5-4179-9EDB-15B725EB8B52}"/>
+                <a16:creationId xmlns:a16="http://schemas.microsoft.com/office/drawing/2014/main" xmlns="" id="{643BFCF4-45B5-4179-9EDB-15B725EB8B52}"/>
               </a:ext>
             </a:extLst>
           </p:cNvPr>
@@ -15493,7 +15795,7 @@
           <p:cNvPr id="7" name="Imagen 6">
             <a:extLst>
               <a:ext uri="{FF2B5EF4-FFF2-40B4-BE49-F238E27FC236}">
-                <a16:creationId xmlns:a16="http://schemas.microsoft.com/office/drawing/2014/main" id="{FEE980EF-852F-45AF-BE81-1E23473519E4}"/>
+                <a16:creationId xmlns:a16="http://schemas.microsoft.com/office/drawing/2014/main" xmlns="" id="{FEE980EF-852F-45AF-BE81-1E23473519E4}"/>
               </a:ext>
             </a:extLst>
           </p:cNvPr>
@@ -15553,7 +15855,7 @@
           <p:cNvPr id="2" name="Título 1">
             <a:extLst>
               <a:ext uri="{FF2B5EF4-FFF2-40B4-BE49-F238E27FC236}">
-                <a16:creationId xmlns:a16="http://schemas.microsoft.com/office/drawing/2014/main" id="{6EFEE9D8-735E-4B05-9DD3-FE56311BCA31}"/>
+                <a16:creationId xmlns:a16="http://schemas.microsoft.com/office/drawing/2014/main" xmlns="" id="{6EFEE9D8-735E-4B05-9DD3-FE56311BCA31}"/>
               </a:ext>
             </a:extLst>
           </p:cNvPr>
@@ -15595,8 +15897,8 @@
         </p:blipFill>
         <p:spPr>
           <a:xfrm>
-            <a:off x="1154954" y="1806710"/>
-            <a:ext cx="5705475" cy="3076575"/>
+            <a:off x="558607" y="1752772"/>
+            <a:ext cx="4699194" cy="2533956"/>
           </a:xfrm>
           <a:prstGeom prst="rect">
             <a:avLst/>
@@ -15619,8 +15921,8 @@
         </p:blipFill>
         <p:spPr>
           <a:xfrm>
-            <a:off x="5925911" y="4883285"/>
-            <a:ext cx="5695950" cy="1581150"/>
+            <a:off x="2865607" y="4894889"/>
+            <a:ext cx="4588741" cy="1273798"/>
           </a:xfrm>
           <a:prstGeom prst="rect">
             <a:avLst/>
@@ -15635,7 +15937,7 @@
         </p:nvSpPr>
         <p:spPr>
           <a:xfrm>
-            <a:off x="7262949" y="2534194"/>
+            <a:off x="5404332" y="2430128"/>
             <a:ext cx="3944982" cy="369332"/>
           </a:xfrm>
           <a:prstGeom prst="rect">
@@ -15669,7 +15971,7 @@
         </p:nvSpPr>
         <p:spPr>
           <a:xfrm>
-            <a:off x="2116183" y="5304528"/>
+            <a:off x="558607" y="5051834"/>
             <a:ext cx="3566160" cy="369332"/>
           </a:xfrm>
           <a:prstGeom prst="rect">
@@ -15690,6 +15992,30 @@
           </a:p>
         </p:txBody>
       </p:sp>
+      <p:pic>
+        <p:nvPicPr>
+          <p:cNvPr id="3" name="Imagen 2"/>
+          <p:cNvPicPr>
+            <a:picLocks noChangeAspect="1"/>
+          </p:cNvPicPr>
+          <p:nvPr/>
+        </p:nvPicPr>
+        <p:blipFill>
+          <a:blip r:embed="rId4"/>
+          <a:stretch>
+            <a:fillRect/>
+          </a:stretch>
+        </p:blipFill>
+        <p:spPr>
+          <a:xfrm>
+            <a:off x="6850122" y="2940237"/>
+            <a:ext cx="4695079" cy="1524573"/>
+          </a:xfrm>
+          <a:prstGeom prst="rect">
+            <a:avLst/>
+          </a:prstGeom>
+        </p:spPr>
+      </p:pic>
     </p:spTree>
     <p:extLst>
       <p:ext uri="{BB962C8B-B14F-4D97-AF65-F5344CB8AC3E}">

</xml_diff>